<commit_message>
added images in presentation
</commit_message>
<xml_diff>
--- a/Carlo_Radice_807159_MCSLinearSystemSolver.pptx
+++ b/Carlo_Radice_807159_MCSLinearSystemSolver.pptx
@@ -17754,12 +17754,20 @@
           </a:p>
           <a:p>
             <a:r>
+              <a:rPr lang="en-GB" b="1" dirty="0">
+                <a:solidFill>
+                  <a:srgbClr val="0070C0"/>
+                </a:solidFill>
+              </a:rPr>
+              <a:t>Windows</a:t>
+            </a:r>
+            <a:r>
               <a:rPr lang="en-GB" dirty="0">
                 <a:solidFill>
                   <a:srgbClr val="0070C0"/>
                 </a:solidFill>
               </a:rPr>
-              <a:t>Windows </a:t>
+              <a:t> </a:t>
             </a:r>
             <a:r>
               <a:rPr lang="en-GB" dirty="0">
@@ -17770,7 +17778,7 @@
               <a:t>performs better than </a:t>
             </a:r>
             <a:r>
-              <a:rPr lang="en-GB" dirty="0">
+              <a:rPr lang="en-GB" b="1" dirty="0">
                 <a:solidFill>
                   <a:schemeClr val="accent3"/>
                 </a:solidFill>
@@ -17783,12 +17791,24 @@
                   <a:srgbClr val="595959"/>
                 </a:solidFill>
               </a:rPr>
-              <a:t> in Eigen computation time and </a:t>
-            </a:r>
-            <a:r>
-              <a:rPr lang="en-GB" dirty="0" err="1">
+              <a:t> in </a:t>
+            </a:r>
+            <a:r>
+              <a:rPr lang="en-GB" b="1" dirty="0"/>
+              <a:t>Eigen</a:t>
+            </a:r>
+            <a:r>
+              <a:rPr lang="en-GB" dirty="0">
                 <a:solidFill>
                   <a:srgbClr val="595959"/>
+                </a:solidFill>
+              </a:rPr>
+              <a:t> computation time and </a:t>
+            </a:r>
+            <a:r>
+              <a:rPr lang="en-GB" b="1" dirty="0" err="1">
+                <a:solidFill>
+                  <a:schemeClr val="tx1"/>
                 </a:solidFill>
               </a:rPr>
               <a:t>Matlab</a:t>
@@ -17850,9 +17870,9 @@
           </a:p>
           <a:p>
             <a:r>
-              <a:rPr lang="en-GB" dirty="0" err="1">
+              <a:rPr lang="en-GB" b="1" dirty="0" err="1">
                 <a:solidFill>
-                  <a:srgbClr val="595959"/>
+                  <a:schemeClr val="tx1"/>
                 </a:solidFill>
               </a:rPr>
               <a:t>Matlab</a:t>
@@ -17863,7 +17883,19 @@
                   <a:srgbClr val="595959"/>
                 </a:solidFill>
               </a:rPr>
-              <a:t> outclasses Eigen in the computation time</a:t>
+              <a:t> outclasses </a:t>
+            </a:r>
+            <a:r>
+              <a:rPr lang="en-GB" b="1" dirty="0"/>
+              <a:t>Eigen</a:t>
+            </a:r>
+            <a:r>
+              <a:rPr lang="en-GB" dirty="0">
+                <a:solidFill>
+                  <a:srgbClr val="595959"/>
+                </a:solidFill>
+              </a:rPr>
+              <a:t> in the computation time</a:t>
             </a:r>
           </a:p>
           <a:p>
@@ -17886,9 +17918,9 @@
               <a:t>With big matrices </a:t>
             </a:r>
             <a:r>
-              <a:rPr lang="en-GB" dirty="0" err="1">
+              <a:rPr lang="en-GB" b="1" dirty="0" err="1">
                 <a:solidFill>
-                  <a:srgbClr val="595959"/>
+                  <a:schemeClr val="tx1"/>
                 </a:solidFill>
               </a:rPr>
               <a:t>Matlab</a:t>
@@ -17902,7 +17934,7 @@
               <a:t> performs better in memory both in </a:t>
             </a:r>
             <a:r>
-              <a:rPr lang="en-GB" dirty="0">
+              <a:rPr lang="en-GB" b="1" dirty="0">
                 <a:solidFill>
                   <a:srgbClr val="0070C0"/>
                 </a:solidFill>
@@ -17918,7 +17950,7 @@
               <a:t> and </a:t>
             </a:r>
             <a:r>
-              <a:rPr lang="en-GB" dirty="0">
+              <a:rPr lang="en-GB" b="1" dirty="0">
                 <a:solidFill>
                   <a:schemeClr val="accent3"/>
                 </a:solidFill>
@@ -17943,7 +17975,19 @@
                   <a:srgbClr val="595959"/>
                 </a:solidFill>
               </a:rPr>
-              <a:t>With small matrices Eigen has lower memory usage</a:t>
+              <a:t>With small matrices </a:t>
+            </a:r>
+            <a:r>
+              <a:rPr lang="en-GB" b="1" dirty="0"/>
+              <a:t>Eigen</a:t>
+            </a:r>
+            <a:r>
+              <a:rPr lang="en-GB" dirty="0">
+                <a:solidFill>
+                  <a:srgbClr val="595959"/>
+                </a:solidFill>
+              </a:rPr>
+              <a:t> has lower memory usage</a:t>
             </a:r>
           </a:p>
           <a:p>
@@ -17958,9 +18002,9 @@
           </a:p>
           <a:p>
             <a:r>
-              <a:rPr lang="en-GB" dirty="0" err="1">
+              <a:rPr lang="en-GB" b="1" dirty="0" err="1">
                 <a:solidFill>
-                  <a:srgbClr val="595959"/>
+                  <a:schemeClr val="tx1"/>
                 </a:solidFill>
               </a:rPr>
               <a:t>Matlab</a:t>
@@ -17971,7 +18015,19 @@
                   <a:srgbClr val="595959"/>
                 </a:solidFill>
               </a:rPr>
-              <a:t> and Eigen have similar relative error values</a:t>
+              <a:t> and </a:t>
+            </a:r>
+            <a:r>
+              <a:rPr lang="en-GB" b="1" dirty="0"/>
+              <a:t>Eigen</a:t>
+            </a:r>
+            <a:r>
+              <a:rPr lang="en-GB" dirty="0">
+                <a:solidFill>
+                  <a:srgbClr val="595959"/>
+                </a:solidFill>
+              </a:rPr>
+              <a:t> have similar relative error values</a:t>
             </a:r>
           </a:p>
         </p:txBody>
@@ -19278,6 +19334,36 @@
           </a:p>
         </p:txBody>
       </p:sp>
+      <p:pic>
+        <p:nvPicPr>
+          <p:cNvPr id="4" name="Immagine 3">
+            <a:extLst>
+              <a:ext uri="{FF2B5EF4-FFF2-40B4-BE49-F238E27FC236}">
+                <a16:creationId xmlns:a16="http://schemas.microsoft.com/office/drawing/2014/main" id="{262DDDBA-08D7-4738-8415-F465F0850C0E}"/>
+              </a:ext>
+            </a:extLst>
+          </p:cNvPr>
+          <p:cNvPicPr>
+            <a:picLocks noChangeAspect="1"/>
+          </p:cNvPicPr>
+          <p:nvPr/>
+        </p:nvPicPr>
+        <p:blipFill>
+          <a:blip r:embed="rId4"/>
+          <a:stretch>
+            <a:fillRect/>
+          </a:stretch>
+        </p:blipFill>
+        <p:spPr>
+          <a:xfrm>
+            <a:off x="2405449" y="581554"/>
+            <a:ext cx="587132" cy="524280"/>
+          </a:xfrm>
+          <a:prstGeom prst="rect">
+            <a:avLst/>
+          </a:prstGeom>
+        </p:spPr>
+      </p:pic>
     </p:spTree>
     <p:extLst>
       <p:ext uri="{BB962C8B-B14F-4D97-AF65-F5344CB8AC3E}">
@@ -19878,6 +19964,36 @@
           </a:p>
         </p:txBody>
       </p:sp>
+      <p:pic>
+        <p:nvPicPr>
+          <p:cNvPr id="4" name="Immagine 3">
+            <a:extLst>
+              <a:ext uri="{FF2B5EF4-FFF2-40B4-BE49-F238E27FC236}">
+                <a16:creationId xmlns:a16="http://schemas.microsoft.com/office/drawing/2014/main" id="{7C3C3A9C-93FC-4264-8C9F-628163DC12C1}"/>
+              </a:ext>
+            </a:extLst>
+          </p:cNvPr>
+          <p:cNvPicPr>
+            <a:picLocks noChangeAspect="1"/>
+          </p:cNvPicPr>
+          <p:nvPr/>
+        </p:nvPicPr>
+        <p:blipFill>
+          <a:blip r:embed="rId4"/>
+          <a:stretch>
+            <a:fillRect/>
+          </a:stretch>
+        </p:blipFill>
+        <p:spPr>
+          <a:xfrm>
+            <a:off x="2344013" y="492782"/>
+            <a:ext cx="641638" cy="687469"/>
+          </a:xfrm>
+          <a:prstGeom prst="rect">
+            <a:avLst/>
+          </a:prstGeom>
+        </p:spPr>
+      </p:pic>
     </p:spTree>
   </p:cSld>
   <p:clrMapOvr>

</xml_diff>